<commit_message>
length of game cycles as parameter
</commit_message>
<xml_diff>
--- a/Brainstorming/Motivation.pptx
+++ b/Brainstorming/Motivation.pptx
@@ -14,6 +14,7 @@
     <p:sldId id="260" r:id="rId8"/>
     <p:sldId id="258" r:id="rId9"/>
     <p:sldId id="259" r:id="rId10"/>
+    <p:sldId id="261" r:id="rId11"/>
   </p:sldIdLst>
   <p:sldSz cx="12192000" cy="6858000"/>
   <p:notesSz cx="6858000" cy="9144000"/>
@@ -1781,7 +1782,7 @@
                 </a:solidFill>
               </a:rPr>
               <a:pPr/>
-              <a:t>04.02.2016</a:t>
+              <a:t>15.02.2016</a:t>
             </a:fld>
             <a:endParaRPr lang="de-DE">
               <a:solidFill>
@@ -2042,7 +2043,7 @@
                 </a:solidFill>
               </a:rPr>
               <a:pPr/>
-              <a:t>2/4/2016</a:t>
+              <a:t>2/15/2016</a:t>
             </a:fld>
             <a:endParaRPr lang="en-US" dirty="0">
               <a:solidFill>
@@ -2779,7 +2780,7 @@
               <a:pPr>
                 <a:defRPr/>
               </a:pPr>
-              <a:t>2/4/2016</a:t>
+              <a:t>2/15/2016</a:t>
             </a:fld>
             <a:endParaRPr lang="en-US">
               <a:solidFill>
@@ -3077,7 +3078,7 @@
                 </a:solidFill>
               </a:rPr>
               <a:pPr/>
-              <a:t>2/4/2016</a:t>
+              <a:t>2/15/2016</a:t>
             </a:fld>
             <a:endParaRPr lang="en-US">
               <a:solidFill>
@@ -4597,7 +4598,7 @@
                 </a:solidFill>
               </a:rPr>
               <a:pPr/>
-              <a:t>04.02.2016</a:t>
+              <a:t>15.02.2016</a:t>
             </a:fld>
             <a:endParaRPr lang="de-DE">
               <a:solidFill>
@@ -5172,7 +5173,7 @@
                 </a:solidFill>
               </a:rPr>
               <a:pPr defTabSz="342900"/>
-              <a:t>2/4/2016</a:t>
+              <a:t>2/15/2016</a:t>
             </a:fld>
             <a:endParaRPr lang="en-US" dirty="0">
               <a:solidFill>
@@ -5952,7 +5953,7 @@
               <a:pPr defTabSz="457200">
                 <a:defRPr/>
               </a:pPr>
-              <a:t>2/4/2016</a:t>
+              <a:t>2/15/2016</a:t>
             </a:fld>
             <a:endParaRPr lang="en-US" dirty="0">
               <a:solidFill>
@@ -6957,7 +6958,7 @@
                 </a:solidFill>
               </a:rPr>
               <a:pPr/>
-              <a:t>2/4/2016</a:t>
+              <a:t>2/15/2016</a:t>
             </a:fld>
             <a:endParaRPr lang="en-US">
               <a:solidFill>
@@ -8440,8 +8441,8 @@
           </a:p>
         </p:txBody>
       </p:sp>
-      <mc:AlternateContent xmlns:mc="http://schemas.openxmlformats.org/markup-compatibility/2006">
-        <mc:Choice xmlns:a14="http://schemas.microsoft.com/office/drawing/2010/main" Requires="a14">
+      <mc:AlternateContent xmlns:mc="http://schemas.openxmlformats.org/markup-compatibility/2006" xmlns:a14="http://schemas.microsoft.com/office/drawing/2010/main">
+        <mc:Choice Requires="a14">
           <p:sp>
             <p:nvSpPr>
               <p:cNvPr id="3" name="Inhaltsplatzhalter 2"/>
@@ -9645,7 +9646,7 @@
             </p:txBody>
           </p:sp>
         </mc:Choice>
-        <mc:Fallback>
+        <mc:Fallback xmlns="">
           <p:sp>
             <p:nvSpPr>
               <p:cNvPr id="3" name="Inhaltsplatzhalter 2"/>
@@ -9775,6 +9776,13 @@
   <p:clrMapOvr>
     <a:masterClrMapping/>
   </p:clrMapOvr>
+  <p:timing>
+    <p:tnLst>
+      <p:par>
+        <p:cTn id="1" dur="indefinite" restart="never" nodeType="tmRoot"/>
+      </p:par>
+    </p:tnLst>
+  </p:timing>
 </p:sld>
 </file>
 
@@ -9854,8 +9862,8 @@
           </a:p>
         </p:txBody>
       </p:sp>
-      <mc:AlternateContent xmlns:mc="http://schemas.openxmlformats.org/markup-compatibility/2006">
-        <mc:Choice xmlns:a14="http://schemas.microsoft.com/office/drawing/2010/main" Requires="a14">
+      <mc:AlternateContent xmlns:mc="http://schemas.openxmlformats.org/markup-compatibility/2006" xmlns:a14="http://schemas.microsoft.com/office/drawing/2010/main">
+        <mc:Choice Requires="a14">
           <p:sp>
             <p:nvSpPr>
               <p:cNvPr id="3" name="Inhaltsplatzhalter 2"/>
@@ -10516,7 +10524,7 @@
             </p:txBody>
           </p:sp>
         </mc:Choice>
-        <mc:Fallback>
+        <mc:Fallback xmlns="">
           <p:sp>
             <p:nvSpPr>
               <p:cNvPr id="3" name="Inhaltsplatzhalter 2"/>
@@ -10567,6 +10575,1346 @@
       </p:par>
     </p:tnLst>
   </p:timing>
+</p:sld>
+</file>
+
+<file path=ppt/slides/slide5.xml><?xml version="1.0" encoding="utf-8"?>
+<p:sld xmlns:a="http://schemas.openxmlformats.org/drawingml/2006/main" xmlns:r="http://schemas.openxmlformats.org/officeDocument/2006/relationships" xmlns:p="http://schemas.openxmlformats.org/presentationml/2006/main">
+  <p:cSld>
+    <p:spTree>
+      <p:nvGrpSpPr>
+        <p:cNvPr id="1" name=""/>
+        <p:cNvGrpSpPr/>
+        <p:nvPr/>
+      </p:nvGrpSpPr>
+      <p:grpSpPr>
+        <a:xfrm>
+          <a:off x="0" y="0"/>
+          <a:ext cx="0" cy="0"/>
+          <a:chOff x="0" y="0"/>
+          <a:chExt cx="0" cy="0"/>
+        </a:xfrm>
+      </p:grpSpPr>
+      <p:pic>
+        <p:nvPicPr>
+          <p:cNvPr id="7" name="Grafik 6"/>
+          <p:cNvPicPr>
+            <a:picLocks noChangeAspect="1"/>
+          </p:cNvPicPr>
+          <p:nvPr/>
+        </p:nvPicPr>
+        <p:blipFill>
+          <a:blip r:embed="rId2" cstate="print">
+            <a:extLst>
+              <a:ext uri="{28A0092B-C50C-407E-A947-70E740481C1C}">
+                <a14:useLocalDpi xmlns:a14="http://schemas.microsoft.com/office/drawing/2010/main" val="0"/>
+              </a:ext>
+            </a:extLst>
+          </a:blip>
+          <a:stretch>
+            <a:fillRect/>
+          </a:stretch>
+        </p:blipFill>
+        <p:spPr>
+          <a:xfrm>
+            <a:off x="424681" y="3421661"/>
+            <a:ext cx="1803192" cy="1792096"/>
+          </a:xfrm>
+          <a:prstGeom prst="rect">
+            <a:avLst/>
+          </a:prstGeom>
+        </p:spPr>
+      </p:pic>
+      <p:pic>
+        <p:nvPicPr>
+          <p:cNvPr id="11" name="Grafik 10"/>
+          <p:cNvPicPr>
+            <a:picLocks noChangeAspect="1"/>
+          </p:cNvPicPr>
+          <p:nvPr/>
+        </p:nvPicPr>
+        <p:blipFill>
+          <a:blip r:embed="rId3" cstate="print">
+            <a:extLst>
+              <a:ext uri="{28A0092B-C50C-407E-A947-70E740481C1C}">
+                <a14:useLocalDpi xmlns:a14="http://schemas.microsoft.com/office/drawing/2010/main" val="0"/>
+              </a:ext>
+            </a:extLst>
+          </a:blip>
+          <a:stretch>
+            <a:fillRect/>
+          </a:stretch>
+        </p:blipFill>
+        <p:spPr>
+          <a:xfrm>
+            <a:off x="424681" y="1426128"/>
+            <a:ext cx="1583339" cy="1715548"/>
+          </a:xfrm>
+          <a:prstGeom prst="rect">
+            <a:avLst/>
+          </a:prstGeom>
+        </p:spPr>
+      </p:pic>
+      <p:pic>
+        <p:nvPicPr>
+          <p:cNvPr id="4" name="Grafik 3"/>
+          <p:cNvPicPr>
+            <a:picLocks noChangeAspect="1"/>
+          </p:cNvPicPr>
+          <p:nvPr/>
+        </p:nvPicPr>
+        <p:blipFill>
+          <a:blip r:embed="rId4" cstate="print">
+            <a:extLst>
+              <a:ext uri="{28A0092B-C50C-407E-A947-70E740481C1C}">
+                <a14:useLocalDpi xmlns:a14="http://schemas.microsoft.com/office/drawing/2010/main" val="0"/>
+              </a:ext>
+            </a:extLst>
+          </a:blip>
+          <a:stretch>
+            <a:fillRect/>
+          </a:stretch>
+        </p:blipFill>
+        <p:spPr>
+          <a:xfrm>
+            <a:off x="3922766" y="1506406"/>
+            <a:ext cx="3032053" cy="1705530"/>
+          </a:xfrm>
+          <a:prstGeom prst="rect">
+            <a:avLst/>
+          </a:prstGeom>
+        </p:spPr>
+      </p:pic>
+      <p:pic>
+        <p:nvPicPr>
+          <p:cNvPr id="5" name="Grafik 4"/>
+          <p:cNvPicPr>
+            <a:picLocks noChangeAspect="1"/>
+          </p:cNvPicPr>
+          <p:nvPr/>
+        </p:nvPicPr>
+        <p:blipFill>
+          <a:blip r:embed="rId5" cstate="print">
+            <a:extLst>
+              <a:ext uri="{28A0092B-C50C-407E-A947-70E740481C1C}">
+                <a14:useLocalDpi xmlns:a14="http://schemas.microsoft.com/office/drawing/2010/main" val="0"/>
+              </a:ext>
+            </a:extLst>
+          </a:blip>
+          <a:stretch>
+            <a:fillRect/>
+          </a:stretch>
+        </p:blipFill>
+        <p:spPr>
+          <a:xfrm>
+            <a:off x="8729478" y="2245662"/>
+            <a:ext cx="3213521" cy="2088789"/>
+          </a:xfrm>
+          <a:prstGeom prst="rect">
+            <a:avLst/>
+          </a:prstGeom>
+        </p:spPr>
+      </p:pic>
+      <p:pic>
+        <p:nvPicPr>
+          <p:cNvPr id="6" name="Inhaltsplatzhalter 3"/>
+          <p:cNvPicPr>
+            <a:picLocks noGrp="1" noChangeAspect="1"/>
+          </p:cNvPicPr>
+          <p:nvPr>
+            <p:ph idx="1"/>
+          </p:nvPr>
+        </p:nvPicPr>
+        <p:blipFill>
+          <a:blip r:embed="rId6" cstate="print">
+            <a:extLst>
+              <a:ext uri="{28A0092B-C50C-407E-A947-70E740481C1C}">
+                <a14:useLocalDpi xmlns:a14="http://schemas.microsoft.com/office/drawing/2010/main" val="0"/>
+              </a:ext>
+            </a:extLst>
+          </a:blip>
+          <a:stretch>
+            <a:fillRect/>
+          </a:stretch>
+        </p:blipFill>
+        <p:spPr>
+          <a:xfrm>
+            <a:off x="3922766" y="3421770"/>
+            <a:ext cx="3032053" cy="1705530"/>
+          </a:xfrm>
+        </p:spPr>
+      </p:pic>
+      <p:sp>
+        <p:nvSpPr>
+          <p:cNvPr id="2" name="Rechteck 1"/>
+          <p:cNvSpPr/>
+          <p:nvPr/>
+        </p:nvSpPr>
+        <p:spPr>
+          <a:xfrm>
+            <a:off x="151818" y="5570290"/>
+            <a:ext cx="2348101" cy="947956"/>
+          </a:xfrm>
+          <a:prstGeom prst="rect">
+            <a:avLst/>
+          </a:prstGeom>
+        </p:spPr>
+        <p:style>
+          <a:lnRef idx="1">
+            <a:schemeClr val="accent1"/>
+          </a:lnRef>
+          <a:fillRef idx="3">
+            <a:schemeClr val="accent1"/>
+          </a:fillRef>
+          <a:effectRef idx="2">
+            <a:schemeClr val="accent1"/>
+          </a:effectRef>
+          <a:fontRef idx="minor">
+            <a:schemeClr val="lt1"/>
+          </a:fontRef>
+        </p:style>
+        <p:txBody>
+          <a:bodyPr rtlCol="0" anchor="ctr"/>
+          <a:lstStyle/>
+          <a:p>
+            <a:pPr algn="ctr"/>
+            <a:r>
+              <a:rPr lang="de-DE" dirty="0" smtClean="0"/>
+              <a:t>Network Layer,</a:t>
+            </a:r>
+          </a:p>
+          <a:p>
+            <a:pPr algn="ctr"/>
+            <a:r>
+              <a:rPr lang="de-DE" dirty="0" smtClean="0"/>
+              <a:t>Hardware Layer</a:t>
+            </a:r>
+            <a:endParaRPr lang="en-US" dirty="0"/>
+          </a:p>
+        </p:txBody>
+      </p:sp>
+      <p:sp>
+        <p:nvSpPr>
+          <p:cNvPr id="8" name="Rechteck 7"/>
+          <p:cNvSpPr/>
+          <p:nvPr/>
+        </p:nvSpPr>
+        <p:spPr>
+          <a:xfrm>
+            <a:off x="4264333" y="5570290"/>
+            <a:ext cx="2348917" cy="914400"/>
+          </a:xfrm>
+          <a:prstGeom prst="rect">
+            <a:avLst/>
+          </a:prstGeom>
+        </p:spPr>
+        <p:style>
+          <a:lnRef idx="1">
+            <a:schemeClr val="accent1"/>
+          </a:lnRef>
+          <a:fillRef idx="3">
+            <a:schemeClr val="accent1"/>
+          </a:fillRef>
+          <a:effectRef idx="2">
+            <a:schemeClr val="accent1"/>
+          </a:effectRef>
+          <a:fontRef idx="minor">
+            <a:schemeClr val="lt1"/>
+          </a:fontRef>
+        </p:style>
+        <p:txBody>
+          <a:bodyPr rtlCol="0" anchor="ctr"/>
+          <a:lstStyle/>
+          <a:p>
+            <a:pPr algn="ctr"/>
+            <a:r>
+              <a:rPr lang="de-DE" dirty="0" err="1" smtClean="0"/>
+              <a:t>Application</a:t>
+            </a:r>
+            <a:r>
+              <a:rPr lang="de-DE" dirty="0" smtClean="0"/>
+              <a:t> Layer</a:t>
+            </a:r>
+            <a:endParaRPr lang="en-US" dirty="0"/>
+          </a:p>
+        </p:txBody>
+      </p:sp>
+      <p:sp>
+        <p:nvSpPr>
+          <p:cNvPr id="9" name="Rechteck 8"/>
+          <p:cNvSpPr/>
+          <p:nvPr/>
+        </p:nvSpPr>
+        <p:spPr>
+          <a:xfrm>
+            <a:off x="9161781" y="5570290"/>
+            <a:ext cx="2348917" cy="914400"/>
+          </a:xfrm>
+          <a:prstGeom prst="rect">
+            <a:avLst/>
+          </a:prstGeom>
+        </p:spPr>
+        <p:style>
+          <a:lnRef idx="1">
+            <a:schemeClr val="accent1"/>
+          </a:lnRef>
+          <a:fillRef idx="3">
+            <a:schemeClr val="accent1"/>
+          </a:fillRef>
+          <a:effectRef idx="2">
+            <a:schemeClr val="accent1"/>
+          </a:effectRef>
+          <a:fontRef idx="minor">
+            <a:schemeClr val="lt1"/>
+          </a:fontRef>
+        </p:style>
+        <p:txBody>
+          <a:bodyPr rtlCol="0" anchor="ctr"/>
+          <a:lstStyle/>
+          <a:p>
+            <a:pPr algn="ctr"/>
+            <a:r>
+              <a:rPr lang="de-DE" dirty="0" err="1" smtClean="0"/>
+              <a:t>QoE</a:t>
+            </a:r>
+            <a:r>
+              <a:rPr lang="de-DE" dirty="0" smtClean="0"/>
+              <a:t>,</a:t>
+            </a:r>
+            <a:endParaRPr lang="de-DE" dirty="0"/>
+          </a:p>
+          <a:p>
+            <a:pPr algn="ctr"/>
+            <a:r>
+              <a:rPr lang="de-DE" dirty="0" smtClean="0"/>
+              <a:t>User Engagement</a:t>
+            </a:r>
+            <a:endParaRPr lang="en-US" dirty="0"/>
+          </a:p>
+        </p:txBody>
+      </p:sp>
+      <p:cxnSp>
+        <p:nvCxnSpPr>
+          <p:cNvPr id="12" name="Gerade Verbindung mit Pfeil 11"/>
+          <p:cNvCxnSpPr>
+            <a:stCxn id="2" idx="3"/>
+            <a:endCxn id="8" idx="1"/>
+          </p:cNvCxnSpPr>
+          <p:nvPr/>
+        </p:nvCxnSpPr>
+        <p:spPr>
+          <a:xfrm flipV="1">
+            <a:off x="2499919" y="6027490"/>
+            <a:ext cx="1764414" cy="16778"/>
+          </a:xfrm>
+          <a:prstGeom prst="straightConnector1">
+            <a:avLst/>
+          </a:prstGeom>
+          <a:ln w="127000">
+            <a:tailEnd type="triangle"/>
+          </a:ln>
+        </p:spPr>
+        <p:style>
+          <a:lnRef idx="2">
+            <a:schemeClr val="accent1"/>
+          </a:lnRef>
+          <a:fillRef idx="0">
+            <a:schemeClr val="accent1"/>
+          </a:fillRef>
+          <a:effectRef idx="1">
+            <a:schemeClr val="accent1"/>
+          </a:effectRef>
+          <a:fontRef idx="minor">
+            <a:schemeClr val="tx1"/>
+          </a:fontRef>
+        </p:style>
+      </p:cxnSp>
+      <p:cxnSp>
+        <p:nvCxnSpPr>
+          <p:cNvPr id="13" name="Gerade Verbindung mit Pfeil 12"/>
+          <p:cNvCxnSpPr>
+            <a:stCxn id="8" idx="3"/>
+            <a:endCxn id="9" idx="1"/>
+          </p:cNvCxnSpPr>
+          <p:nvPr/>
+        </p:nvCxnSpPr>
+        <p:spPr>
+          <a:xfrm>
+            <a:off x="6613250" y="6027490"/>
+            <a:ext cx="2548531" cy="0"/>
+          </a:xfrm>
+          <a:prstGeom prst="straightConnector1">
+            <a:avLst/>
+          </a:prstGeom>
+          <a:ln w="127000">
+            <a:tailEnd type="triangle"/>
+          </a:ln>
+        </p:spPr>
+        <p:style>
+          <a:lnRef idx="2">
+            <a:schemeClr val="accent1"/>
+          </a:lnRef>
+          <a:fillRef idx="0">
+            <a:schemeClr val="accent1"/>
+          </a:fillRef>
+          <a:effectRef idx="1">
+            <a:schemeClr val="accent1"/>
+          </a:effectRef>
+          <a:fontRef idx="minor">
+            <a:schemeClr val="tx1"/>
+          </a:fontRef>
+        </p:style>
+      </p:cxnSp>
+      <p:cxnSp>
+        <p:nvCxnSpPr>
+          <p:cNvPr id="16" name="Gerade Verbindung mit Pfeil 15"/>
+          <p:cNvCxnSpPr/>
+          <p:nvPr/>
+        </p:nvCxnSpPr>
+        <p:spPr>
+          <a:xfrm flipV="1">
+            <a:off x="2008020" y="3273279"/>
+            <a:ext cx="1764414" cy="16778"/>
+          </a:xfrm>
+          <a:prstGeom prst="straightConnector1">
+            <a:avLst/>
+          </a:prstGeom>
+          <a:ln w="127000">
+            <a:tailEnd type="triangle"/>
+          </a:ln>
+        </p:spPr>
+        <p:style>
+          <a:lnRef idx="2">
+            <a:schemeClr val="accent1"/>
+          </a:lnRef>
+          <a:fillRef idx="0">
+            <a:schemeClr val="accent1"/>
+          </a:fillRef>
+          <a:effectRef idx="1">
+            <a:schemeClr val="accent1"/>
+          </a:effectRef>
+          <a:fontRef idx="minor">
+            <a:schemeClr val="tx1"/>
+          </a:fontRef>
+        </p:style>
+      </p:cxnSp>
+      <p:cxnSp>
+        <p:nvCxnSpPr>
+          <p:cNvPr id="17" name="Gerade Verbindung mit Pfeil 16"/>
+          <p:cNvCxnSpPr/>
+          <p:nvPr/>
+        </p:nvCxnSpPr>
+        <p:spPr>
+          <a:xfrm flipV="1">
+            <a:off x="2008020" y="2198965"/>
+            <a:ext cx="1764414" cy="16778"/>
+          </a:xfrm>
+          <a:prstGeom prst="straightConnector1">
+            <a:avLst/>
+          </a:prstGeom>
+          <a:ln w="127000">
+            <a:tailEnd type="triangle"/>
+          </a:ln>
+        </p:spPr>
+        <p:style>
+          <a:lnRef idx="2">
+            <a:schemeClr val="accent1"/>
+          </a:lnRef>
+          <a:fillRef idx="0">
+            <a:schemeClr val="accent1"/>
+          </a:fillRef>
+          <a:effectRef idx="1">
+            <a:schemeClr val="accent1"/>
+          </a:effectRef>
+          <a:fontRef idx="minor">
+            <a:schemeClr val="tx1"/>
+          </a:fontRef>
+        </p:style>
+      </p:cxnSp>
+      <p:cxnSp>
+        <p:nvCxnSpPr>
+          <p:cNvPr id="18" name="Gerade Verbindung mit Pfeil 17"/>
+          <p:cNvCxnSpPr/>
+          <p:nvPr/>
+        </p:nvCxnSpPr>
+        <p:spPr>
+          <a:xfrm flipV="1">
+            <a:off x="2008020" y="4386359"/>
+            <a:ext cx="1764414" cy="16778"/>
+          </a:xfrm>
+          <a:prstGeom prst="straightConnector1">
+            <a:avLst/>
+          </a:prstGeom>
+          <a:ln w="127000">
+            <a:tailEnd type="triangle"/>
+          </a:ln>
+        </p:spPr>
+        <p:style>
+          <a:lnRef idx="2">
+            <a:schemeClr val="accent1"/>
+          </a:lnRef>
+          <a:fillRef idx="0">
+            <a:schemeClr val="accent1"/>
+          </a:fillRef>
+          <a:effectRef idx="1">
+            <a:schemeClr val="accent1"/>
+          </a:effectRef>
+          <a:fontRef idx="minor">
+            <a:schemeClr val="tx1"/>
+          </a:fontRef>
+        </p:style>
+      </p:cxnSp>
+      <p:cxnSp>
+        <p:nvCxnSpPr>
+          <p:cNvPr id="20" name="Gerade Verbindung mit Pfeil 19"/>
+          <p:cNvCxnSpPr/>
+          <p:nvPr/>
+        </p:nvCxnSpPr>
+        <p:spPr>
+          <a:xfrm flipV="1">
+            <a:off x="7079458" y="2743829"/>
+            <a:ext cx="1764414" cy="16778"/>
+          </a:xfrm>
+          <a:prstGeom prst="straightConnector1">
+            <a:avLst/>
+          </a:prstGeom>
+          <a:ln w="127000">
+            <a:tailEnd type="triangle"/>
+          </a:ln>
+        </p:spPr>
+        <p:style>
+          <a:lnRef idx="2">
+            <a:schemeClr val="accent1"/>
+          </a:lnRef>
+          <a:fillRef idx="0">
+            <a:schemeClr val="accent1"/>
+          </a:fillRef>
+          <a:effectRef idx="1">
+            <a:schemeClr val="accent1"/>
+          </a:effectRef>
+          <a:fontRef idx="minor">
+            <a:schemeClr val="tx1"/>
+          </a:fontRef>
+        </p:style>
+      </p:cxnSp>
+      <p:cxnSp>
+        <p:nvCxnSpPr>
+          <p:cNvPr id="21" name="Gerade Verbindung mit Pfeil 20"/>
+          <p:cNvCxnSpPr/>
+          <p:nvPr/>
+        </p:nvCxnSpPr>
+        <p:spPr>
+          <a:xfrm flipV="1">
+            <a:off x="7079458" y="3943839"/>
+            <a:ext cx="1764414" cy="16778"/>
+          </a:xfrm>
+          <a:prstGeom prst="straightConnector1">
+            <a:avLst/>
+          </a:prstGeom>
+          <a:ln w="127000">
+            <a:tailEnd type="triangle"/>
+          </a:ln>
+        </p:spPr>
+        <p:style>
+          <a:lnRef idx="2">
+            <a:schemeClr val="accent1"/>
+          </a:lnRef>
+          <a:fillRef idx="0">
+            <a:schemeClr val="accent1"/>
+          </a:fillRef>
+          <a:effectRef idx="1">
+            <a:schemeClr val="accent1"/>
+          </a:effectRef>
+          <a:fontRef idx="minor">
+            <a:schemeClr val="tx1"/>
+          </a:fontRef>
+        </p:style>
+      </p:cxnSp>
+      <mc:AlternateContent xmlns:mc="http://schemas.openxmlformats.org/markup-compatibility/2006">
+        <mc:Choice xmlns:a14="http://schemas.microsoft.com/office/drawing/2010/main" Requires="a14">
+          <p:sp>
+            <p:nvSpPr>
+              <p:cNvPr id="22" name="Rechteck 21"/>
+              <p:cNvSpPr/>
+              <p:nvPr/>
+            </p:nvSpPr>
+            <p:spPr>
+              <a:xfrm>
+                <a:off x="7079458" y="2330563"/>
+                <a:ext cx="1583190" cy="390748"/>
+              </a:xfrm>
+              <a:prstGeom prst="rect">
+                <a:avLst/>
+              </a:prstGeom>
+            </p:spPr>
+            <p:txBody>
+              <a:bodyPr wrap="none">
+                <a:spAutoFit/>
+              </a:bodyPr>
+              <a:lstStyle/>
+              <a:p>
+                <a14:m>
+                  <m:oMath xmlns:m="http://schemas.openxmlformats.org/officeDocument/2006/math">
+                    <m:r>
+                      <a:rPr lang="de-DE" i="1" dirty="0" smtClean="0">
+                        <a:latin typeface="Cambria Math" panose="02040503050406030204" pitchFamily="18" charset="0"/>
+                      </a:rPr>
+                      <m:t>𝑓</m:t>
+                    </m:r>
+                    <m:r>
+                      <a:rPr lang="de-DE" i="1" dirty="0" smtClean="0">
+                        <a:latin typeface="Cambria Math" panose="02040503050406030204" pitchFamily="18" charset="0"/>
+                      </a:rPr>
+                      <m:t>(</m:t>
+                    </m:r>
+                    <m:sSub>
+                      <m:sSubPr>
+                        <m:ctrlPr>
+                          <a:rPr lang="de-DE" b="0" i="1" dirty="0" smtClean="0">
+                            <a:latin typeface="Cambria Math" panose="02040503050406030204" pitchFamily="18" charset="0"/>
+                          </a:rPr>
+                        </m:ctrlPr>
+                      </m:sSubPr>
+                      <m:e>
+                        <m:r>
+                          <a:rPr lang="de-DE" i="1" dirty="0" smtClean="0">
+                            <a:latin typeface="Cambria Math" panose="02040503050406030204" pitchFamily="18" charset="0"/>
+                          </a:rPr>
+                          <m:t>𝑆</m:t>
+                        </m:r>
+                      </m:e>
+                      <m:sub>
+                        <m:r>
+                          <a:rPr lang="de-DE" b="0" i="1" dirty="0" smtClean="0">
+                            <a:latin typeface="Cambria Math" panose="02040503050406030204" pitchFamily="18" charset="0"/>
+                          </a:rPr>
+                          <m:t>1</m:t>
+                        </m:r>
+                      </m:sub>
+                    </m:sSub>
+                    <m:r>
+                      <a:rPr lang="de-DE" i="1" dirty="0" err="1">
+                        <a:latin typeface="Cambria Math" panose="02040503050406030204" pitchFamily="18" charset="0"/>
+                      </a:rPr>
+                      <m:t>,</m:t>
+                    </m:r>
+                    <m:r>
+                      <a:rPr lang="de-DE" i="1" dirty="0" err="1">
+                        <a:latin typeface="Cambria Math" panose="02040503050406030204" pitchFamily="18" charset="0"/>
+                      </a:rPr>
+                      <m:t>𝑄𝑜</m:t>
+                    </m:r>
+                    <m:sSub>
+                      <m:sSubPr>
+                        <m:ctrlPr>
+                          <a:rPr lang="de-DE" b="0" i="1" dirty="0" smtClean="0">
+                            <a:latin typeface="Cambria Math" panose="02040503050406030204" pitchFamily="18" charset="0"/>
+                          </a:rPr>
+                        </m:ctrlPr>
+                      </m:sSubPr>
+                      <m:e>
+                        <m:r>
+                          <a:rPr lang="de-DE" b="0" i="1" dirty="0" smtClean="0">
+                            <a:latin typeface="Cambria Math" panose="02040503050406030204" pitchFamily="18" charset="0"/>
+                          </a:rPr>
+                          <m:t>𝑆</m:t>
+                        </m:r>
+                      </m:e>
+                      <m:sub>
+                        <m:r>
+                          <a:rPr lang="de-DE" b="0" i="1" dirty="0" smtClean="0">
+                            <a:latin typeface="Cambria Math" panose="02040503050406030204" pitchFamily="18" charset="0"/>
+                          </a:rPr>
+                          <m:t>𝐴𝑝𝑝</m:t>
+                        </m:r>
+                      </m:sub>
+                    </m:sSub>
+                    <m:r>
+                      <a:rPr lang="de-DE" i="1" dirty="0">
+                        <a:latin typeface="Cambria Math" panose="02040503050406030204" pitchFamily="18" charset="0"/>
+                      </a:rPr>
+                      <m:t>)</m:t>
+                    </m:r>
+                  </m:oMath>
+                </a14:m>
+                <a:r>
+                  <a:rPr lang="de-DE" dirty="0"/>
+                  <a:t> </a:t>
+                </a:r>
+                <a:endParaRPr lang="en-US" dirty="0"/>
+              </a:p>
+            </p:txBody>
+          </p:sp>
+        </mc:Choice>
+        <mc:Fallback>
+          <p:sp>
+            <p:nvSpPr>
+              <p:cNvPr id="22" name="Rechteck 21"/>
+              <p:cNvSpPr>
+                <a:spLocks noRot="1" noChangeAspect="1" noMove="1" noResize="1" noEditPoints="1" noAdjustHandles="1" noChangeArrowheads="1" noChangeShapeType="1" noTextEdit="1"/>
+              </p:cNvSpPr>
+              <p:nvPr/>
+            </p:nvSpPr>
+            <p:spPr>
+              <a:xfrm>
+                <a:off x="7079458" y="2330563"/>
+                <a:ext cx="1583190" cy="390748"/>
+              </a:xfrm>
+              <a:prstGeom prst="rect">
+                <a:avLst/>
+              </a:prstGeom>
+              <a:blipFill rotWithShape="0">
+                <a:blip r:embed="rId7"/>
+                <a:stretch>
+                  <a:fillRect l="-1154" b="-9375"/>
+                </a:stretch>
+              </a:blipFill>
+            </p:spPr>
+            <p:txBody>
+              <a:bodyPr/>
+              <a:lstStyle/>
+              <a:p>
+                <a:r>
+                  <a:rPr lang="en-US">
+                    <a:noFill/>
+                  </a:rPr>
+                  <a:t> </a:t>
+                </a:r>
+              </a:p>
+            </p:txBody>
+          </p:sp>
+        </mc:Fallback>
+      </mc:AlternateContent>
+      <mc:AlternateContent xmlns:mc="http://schemas.openxmlformats.org/markup-compatibility/2006">
+        <mc:Choice xmlns:a14="http://schemas.microsoft.com/office/drawing/2010/main" Requires="a14">
+          <p:sp>
+            <p:nvSpPr>
+              <p:cNvPr id="23" name="Rechteck 22"/>
+              <p:cNvSpPr/>
+              <p:nvPr/>
+            </p:nvSpPr>
+            <p:spPr>
+              <a:xfrm>
+                <a:off x="7079457" y="3486640"/>
+                <a:ext cx="1588512" cy="390748"/>
+              </a:xfrm>
+              <a:prstGeom prst="rect">
+                <a:avLst/>
+              </a:prstGeom>
+            </p:spPr>
+            <p:txBody>
+              <a:bodyPr wrap="none">
+                <a:spAutoFit/>
+              </a:bodyPr>
+              <a:lstStyle/>
+              <a:p>
+                <a14:m>
+                  <m:oMath xmlns:m="http://schemas.openxmlformats.org/officeDocument/2006/math">
+                    <m:r>
+                      <a:rPr lang="de-DE" i="1" dirty="0" smtClean="0">
+                        <a:latin typeface="Cambria Math" panose="02040503050406030204" pitchFamily="18" charset="0"/>
+                      </a:rPr>
+                      <m:t>𝑓</m:t>
+                    </m:r>
+                    <m:r>
+                      <a:rPr lang="de-DE" i="1" dirty="0" smtClean="0">
+                        <a:latin typeface="Cambria Math" panose="02040503050406030204" pitchFamily="18" charset="0"/>
+                      </a:rPr>
+                      <m:t>(</m:t>
+                    </m:r>
+                    <m:sSub>
+                      <m:sSubPr>
+                        <m:ctrlPr>
+                          <a:rPr lang="de-DE" b="0" i="1" dirty="0" smtClean="0">
+                            <a:latin typeface="Cambria Math" panose="02040503050406030204" pitchFamily="18" charset="0"/>
+                          </a:rPr>
+                        </m:ctrlPr>
+                      </m:sSubPr>
+                      <m:e>
+                        <m:r>
+                          <a:rPr lang="de-DE" i="1" dirty="0" smtClean="0">
+                            <a:latin typeface="Cambria Math" panose="02040503050406030204" pitchFamily="18" charset="0"/>
+                          </a:rPr>
+                          <m:t>𝑆</m:t>
+                        </m:r>
+                      </m:e>
+                      <m:sub>
+                        <m:r>
+                          <a:rPr lang="de-DE" b="0" i="1" dirty="0" smtClean="0">
+                            <a:latin typeface="Cambria Math" panose="02040503050406030204" pitchFamily="18" charset="0"/>
+                          </a:rPr>
+                          <m:t>2</m:t>
+                        </m:r>
+                      </m:sub>
+                    </m:sSub>
+                    <m:r>
+                      <a:rPr lang="de-DE" i="1" dirty="0" err="1">
+                        <a:latin typeface="Cambria Math" panose="02040503050406030204" pitchFamily="18" charset="0"/>
+                      </a:rPr>
+                      <m:t>,</m:t>
+                    </m:r>
+                    <m:r>
+                      <a:rPr lang="de-DE" i="1" dirty="0" err="1">
+                        <a:latin typeface="Cambria Math" panose="02040503050406030204" pitchFamily="18" charset="0"/>
+                      </a:rPr>
+                      <m:t>𝑄𝑜</m:t>
+                    </m:r>
+                    <m:sSub>
+                      <m:sSubPr>
+                        <m:ctrlPr>
+                          <a:rPr lang="de-DE" b="0" i="1" dirty="0" smtClean="0">
+                            <a:latin typeface="Cambria Math" panose="02040503050406030204" pitchFamily="18" charset="0"/>
+                          </a:rPr>
+                        </m:ctrlPr>
+                      </m:sSubPr>
+                      <m:e>
+                        <m:r>
+                          <a:rPr lang="de-DE" b="0" i="1" dirty="0" smtClean="0">
+                            <a:latin typeface="Cambria Math" panose="02040503050406030204" pitchFamily="18" charset="0"/>
+                          </a:rPr>
+                          <m:t>𝑆</m:t>
+                        </m:r>
+                      </m:e>
+                      <m:sub>
+                        <m:r>
+                          <a:rPr lang="de-DE" b="0" i="1" dirty="0" smtClean="0">
+                            <a:latin typeface="Cambria Math" panose="02040503050406030204" pitchFamily="18" charset="0"/>
+                          </a:rPr>
+                          <m:t>𝐴𝑝𝑝</m:t>
+                        </m:r>
+                      </m:sub>
+                    </m:sSub>
+                    <m:r>
+                      <a:rPr lang="de-DE" i="1" dirty="0">
+                        <a:latin typeface="Cambria Math" panose="02040503050406030204" pitchFamily="18" charset="0"/>
+                      </a:rPr>
+                      <m:t>)</m:t>
+                    </m:r>
+                  </m:oMath>
+                </a14:m>
+                <a:r>
+                  <a:rPr lang="de-DE" dirty="0"/>
+                  <a:t> </a:t>
+                </a:r>
+                <a:endParaRPr lang="en-US" dirty="0"/>
+              </a:p>
+            </p:txBody>
+          </p:sp>
+        </mc:Choice>
+        <mc:Fallback>
+          <p:sp>
+            <p:nvSpPr>
+              <p:cNvPr id="23" name="Rechteck 22"/>
+              <p:cNvSpPr>
+                <a:spLocks noRot="1" noChangeAspect="1" noMove="1" noResize="1" noEditPoints="1" noAdjustHandles="1" noChangeArrowheads="1" noChangeShapeType="1" noTextEdit="1"/>
+              </p:cNvSpPr>
+              <p:nvPr/>
+            </p:nvSpPr>
+            <p:spPr>
+              <a:xfrm>
+                <a:off x="7079457" y="3486640"/>
+                <a:ext cx="1588512" cy="390748"/>
+              </a:xfrm>
+              <a:prstGeom prst="rect">
+                <a:avLst/>
+              </a:prstGeom>
+              <a:blipFill rotWithShape="0">
+                <a:blip r:embed="rId8"/>
+                <a:stretch>
+                  <a:fillRect l="-1149" b="-7813"/>
+                </a:stretch>
+              </a:blipFill>
+            </p:spPr>
+            <p:txBody>
+              <a:bodyPr/>
+              <a:lstStyle/>
+              <a:p>
+                <a:r>
+                  <a:rPr lang="en-US">
+                    <a:noFill/>
+                  </a:rPr>
+                  <a:t> </a:t>
+                </a:r>
+              </a:p>
+            </p:txBody>
+          </p:sp>
+        </mc:Fallback>
+      </mc:AlternateContent>
+      <mc:AlternateContent xmlns:mc="http://schemas.openxmlformats.org/markup-compatibility/2006">
+        <mc:Choice xmlns:a14="http://schemas.microsoft.com/office/drawing/2010/main" Requires="a14">
+          <p:sp>
+            <p:nvSpPr>
+              <p:cNvPr id="24" name="Rechteck 23"/>
+              <p:cNvSpPr/>
+              <p:nvPr/>
+            </p:nvSpPr>
+            <p:spPr>
+              <a:xfrm>
+                <a:off x="2045407" y="1719897"/>
+                <a:ext cx="1576714" cy="369332"/>
+              </a:xfrm>
+              <a:prstGeom prst="rect">
+                <a:avLst/>
+              </a:prstGeom>
+            </p:spPr>
+            <p:txBody>
+              <a:bodyPr wrap="none">
+                <a:spAutoFit/>
+              </a:bodyPr>
+              <a:lstStyle/>
+              <a:p>
+                <a14:m>
+                  <m:oMath xmlns:m="http://schemas.openxmlformats.org/officeDocument/2006/math">
+                    <m:r>
+                      <a:rPr lang="de-DE" b="0" i="1" dirty="0" smtClean="0">
+                        <a:latin typeface="Cambria Math" panose="02040503050406030204" pitchFamily="18" charset="0"/>
+                      </a:rPr>
+                      <m:t>𝑔</m:t>
+                    </m:r>
+                    <m:r>
+                      <a:rPr lang="de-DE" i="1" dirty="0" smtClean="0">
+                        <a:latin typeface="Cambria Math" panose="02040503050406030204" pitchFamily="18" charset="0"/>
+                      </a:rPr>
+                      <m:t>(</m:t>
+                    </m:r>
+                    <m:sSub>
+                      <m:sSubPr>
+                        <m:ctrlPr>
+                          <a:rPr lang="de-DE" b="0" i="1" dirty="0" smtClean="0">
+                            <a:latin typeface="Cambria Math" panose="02040503050406030204" pitchFamily="18" charset="0"/>
+                          </a:rPr>
+                        </m:ctrlPr>
+                      </m:sSubPr>
+                      <m:e>
+                        <m:r>
+                          <a:rPr lang="de-DE" i="1" dirty="0" smtClean="0">
+                            <a:latin typeface="Cambria Math" panose="02040503050406030204" pitchFamily="18" charset="0"/>
+                          </a:rPr>
+                          <m:t>𝑆</m:t>
+                        </m:r>
+                      </m:e>
+                      <m:sub>
+                        <m:r>
+                          <a:rPr lang="de-DE" b="0" i="1" dirty="0" smtClean="0">
+                            <a:latin typeface="Cambria Math" panose="02040503050406030204" pitchFamily="18" charset="0"/>
+                          </a:rPr>
+                          <m:t>1</m:t>
+                        </m:r>
+                      </m:sub>
+                    </m:sSub>
+                    <m:r>
+                      <a:rPr lang="de-DE" i="1" dirty="0" err="1">
+                        <a:latin typeface="Cambria Math" panose="02040503050406030204" pitchFamily="18" charset="0"/>
+                      </a:rPr>
+                      <m:t>,</m:t>
+                    </m:r>
+                    <m:r>
+                      <a:rPr lang="de-DE" i="1" dirty="0" err="1">
+                        <a:latin typeface="Cambria Math" panose="02040503050406030204" pitchFamily="18" charset="0"/>
+                      </a:rPr>
+                      <m:t>𝑄𝑜</m:t>
+                    </m:r>
+                    <m:sSub>
+                      <m:sSubPr>
+                        <m:ctrlPr>
+                          <a:rPr lang="de-DE" b="0" i="1" dirty="0" smtClean="0">
+                            <a:latin typeface="Cambria Math" panose="02040503050406030204" pitchFamily="18" charset="0"/>
+                          </a:rPr>
+                        </m:ctrlPr>
+                      </m:sSubPr>
+                      <m:e>
+                        <m:r>
+                          <a:rPr lang="de-DE" b="0" i="1" dirty="0" smtClean="0">
+                            <a:latin typeface="Cambria Math" panose="02040503050406030204" pitchFamily="18" charset="0"/>
+                          </a:rPr>
+                          <m:t>𝑆</m:t>
+                        </m:r>
+                      </m:e>
+                      <m:sub>
+                        <m:r>
+                          <a:rPr lang="de-DE" b="0" i="1" dirty="0" smtClean="0">
+                            <a:latin typeface="Cambria Math" panose="02040503050406030204" pitchFamily="18" charset="0"/>
+                          </a:rPr>
+                          <m:t>𝑁𝑒𝑡</m:t>
+                        </m:r>
+                      </m:sub>
+                    </m:sSub>
+                    <m:r>
+                      <a:rPr lang="de-DE" i="1" dirty="0">
+                        <a:latin typeface="Cambria Math" panose="02040503050406030204" pitchFamily="18" charset="0"/>
+                      </a:rPr>
+                      <m:t>)</m:t>
+                    </m:r>
+                  </m:oMath>
+                </a14:m>
+                <a:r>
+                  <a:rPr lang="de-DE" dirty="0"/>
+                  <a:t> </a:t>
+                </a:r>
+                <a:endParaRPr lang="en-US" dirty="0"/>
+              </a:p>
+            </p:txBody>
+          </p:sp>
+        </mc:Choice>
+        <mc:Fallback>
+          <p:sp>
+            <p:nvSpPr>
+              <p:cNvPr id="24" name="Rechteck 23"/>
+              <p:cNvSpPr>
+                <a:spLocks noRot="1" noChangeAspect="1" noMove="1" noResize="1" noEditPoints="1" noAdjustHandles="1" noChangeArrowheads="1" noChangeShapeType="1" noTextEdit="1"/>
+              </p:cNvSpPr>
+              <p:nvPr/>
+            </p:nvSpPr>
+            <p:spPr>
+              <a:xfrm>
+                <a:off x="2045407" y="1719897"/>
+                <a:ext cx="1576714" cy="369332"/>
+              </a:xfrm>
+              <a:prstGeom prst="rect">
+                <a:avLst/>
+              </a:prstGeom>
+              <a:blipFill rotWithShape="0">
+                <a:blip r:embed="rId9"/>
+                <a:stretch>
+                  <a:fillRect b="-13115"/>
+                </a:stretch>
+              </a:blipFill>
+            </p:spPr>
+            <p:txBody>
+              <a:bodyPr/>
+              <a:lstStyle/>
+              <a:p>
+                <a:r>
+                  <a:rPr lang="en-US">
+                    <a:noFill/>
+                  </a:rPr>
+                  <a:t> </a:t>
+                </a:r>
+              </a:p>
+            </p:txBody>
+          </p:sp>
+        </mc:Fallback>
+      </mc:AlternateContent>
+      <mc:AlternateContent xmlns:mc="http://schemas.openxmlformats.org/markup-compatibility/2006">
+        <mc:Choice xmlns:a14="http://schemas.microsoft.com/office/drawing/2010/main" Requires="a14">
+          <p:sp>
+            <p:nvSpPr>
+              <p:cNvPr id="25" name="Rechteck 24"/>
+              <p:cNvSpPr/>
+              <p:nvPr/>
+            </p:nvSpPr>
+            <p:spPr>
+              <a:xfrm>
+                <a:off x="2008020" y="3912381"/>
+                <a:ext cx="1582036" cy="369332"/>
+              </a:xfrm>
+              <a:prstGeom prst="rect">
+                <a:avLst/>
+              </a:prstGeom>
+            </p:spPr>
+            <p:txBody>
+              <a:bodyPr wrap="none">
+                <a:spAutoFit/>
+              </a:bodyPr>
+              <a:lstStyle/>
+              <a:p>
+                <a14:m>
+                  <m:oMath xmlns:m="http://schemas.openxmlformats.org/officeDocument/2006/math">
+                    <m:r>
+                      <a:rPr lang="de-DE" b="0" i="1" dirty="0" smtClean="0">
+                        <a:latin typeface="Cambria Math" panose="02040503050406030204" pitchFamily="18" charset="0"/>
+                      </a:rPr>
+                      <m:t>𝑔</m:t>
+                    </m:r>
+                    <m:r>
+                      <a:rPr lang="de-DE" i="1" dirty="0" smtClean="0">
+                        <a:latin typeface="Cambria Math" panose="02040503050406030204" pitchFamily="18" charset="0"/>
+                      </a:rPr>
+                      <m:t>(</m:t>
+                    </m:r>
+                    <m:sSub>
+                      <m:sSubPr>
+                        <m:ctrlPr>
+                          <a:rPr lang="de-DE" b="0" i="1" dirty="0" smtClean="0">
+                            <a:latin typeface="Cambria Math" panose="02040503050406030204" pitchFamily="18" charset="0"/>
+                          </a:rPr>
+                        </m:ctrlPr>
+                      </m:sSubPr>
+                      <m:e>
+                        <m:r>
+                          <a:rPr lang="de-DE" i="1" dirty="0" smtClean="0">
+                            <a:latin typeface="Cambria Math" panose="02040503050406030204" pitchFamily="18" charset="0"/>
+                          </a:rPr>
+                          <m:t>𝑆</m:t>
+                        </m:r>
+                      </m:e>
+                      <m:sub>
+                        <m:r>
+                          <a:rPr lang="de-DE" b="0" i="1" dirty="0" smtClean="0">
+                            <a:latin typeface="Cambria Math" panose="02040503050406030204" pitchFamily="18" charset="0"/>
+                          </a:rPr>
+                          <m:t>3</m:t>
+                        </m:r>
+                      </m:sub>
+                    </m:sSub>
+                    <m:r>
+                      <a:rPr lang="de-DE" i="1" dirty="0" err="1">
+                        <a:latin typeface="Cambria Math" panose="02040503050406030204" pitchFamily="18" charset="0"/>
+                      </a:rPr>
+                      <m:t>,</m:t>
+                    </m:r>
+                    <m:r>
+                      <a:rPr lang="de-DE" i="1" dirty="0" err="1">
+                        <a:latin typeface="Cambria Math" panose="02040503050406030204" pitchFamily="18" charset="0"/>
+                      </a:rPr>
+                      <m:t>𝑄𝑜</m:t>
+                    </m:r>
+                    <m:sSub>
+                      <m:sSubPr>
+                        <m:ctrlPr>
+                          <a:rPr lang="de-DE" b="0" i="1" dirty="0" smtClean="0">
+                            <a:latin typeface="Cambria Math" panose="02040503050406030204" pitchFamily="18" charset="0"/>
+                          </a:rPr>
+                        </m:ctrlPr>
+                      </m:sSubPr>
+                      <m:e>
+                        <m:r>
+                          <a:rPr lang="de-DE" b="0" i="1" dirty="0" smtClean="0">
+                            <a:latin typeface="Cambria Math" panose="02040503050406030204" pitchFamily="18" charset="0"/>
+                          </a:rPr>
+                          <m:t>𝑆</m:t>
+                        </m:r>
+                      </m:e>
+                      <m:sub>
+                        <m:r>
+                          <a:rPr lang="de-DE" b="0" i="1" dirty="0" smtClean="0">
+                            <a:latin typeface="Cambria Math" panose="02040503050406030204" pitchFamily="18" charset="0"/>
+                          </a:rPr>
+                          <m:t>𝑁𝑒𝑡</m:t>
+                        </m:r>
+                      </m:sub>
+                    </m:sSub>
+                    <m:r>
+                      <a:rPr lang="de-DE" i="1" dirty="0">
+                        <a:latin typeface="Cambria Math" panose="02040503050406030204" pitchFamily="18" charset="0"/>
+                      </a:rPr>
+                      <m:t>)</m:t>
+                    </m:r>
+                  </m:oMath>
+                </a14:m>
+                <a:r>
+                  <a:rPr lang="de-DE" dirty="0"/>
+                  <a:t> </a:t>
+                </a:r>
+                <a:endParaRPr lang="en-US" dirty="0"/>
+              </a:p>
+            </p:txBody>
+          </p:sp>
+        </mc:Choice>
+        <mc:Fallback>
+          <p:sp>
+            <p:nvSpPr>
+              <p:cNvPr id="25" name="Rechteck 24"/>
+              <p:cNvSpPr>
+                <a:spLocks noRot="1" noChangeAspect="1" noMove="1" noResize="1" noEditPoints="1" noAdjustHandles="1" noChangeArrowheads="1" noChangeShapeType="1" noTextEdit="1"/>
+              </p:cNvSpPr>
+              <p:nvPr/>
+            </p:nvSpPr>
+            <p:spPr>
+              <a:xfrm>
+                <a:off x="2008020" y="3912381"/>
+                <a:ext cx="1582036" cy="369332"/>
+              </a:xfrm>
+              <a:prstGeom prst="rect">
+                <a:avLst/>
+              </a:prstGeom>
+              <a:blipFill rotWithShape="0">
+                <a:blip r:embed="rId10"/>
+                <a:stretch>
+                  <a:fillRect b="-13333"/>
+                </a:stretch>
+              </a:blipFill>
+            </p:spPr>
+            <p:txBody>
+              <a:bodyPr/>
+              <a:lstStyle/>
+              <a:p>
+                <a:r>
+                  <a:rPr lang="en-US">
+                    <a:noFill/>
+                  </a:rPr>
+                  <a:t> </a:t>
+                </a:r>
+              </a:p>
+            </p:txBody>
+          </p:sp>
+        </mc:Fallback>
+      </mc:AlternateContent>
+      <mc:AlternateContent xmlns:mc="http://schemas.openxmlformats.org/markup-compatibility/2006">
+        <mc:Choice xmlns:a14="http://schemas.microsoft.com/office/drawing/2010/main" Requires="a14">
+          <p:sp>
+            <p:nvSpPr>
+              <p:cNvPr id="26" name="Rechteck 25"/>
+              <p:cNvSpPr/>
+              <p:nvPr/>
+            </p:nvSpPr>
+            <p:spPr>
+              <a:xfrm>
+                <a:off x="2003021" y="2806728"/>
+                <a:ext cx="1582036" cy="369332"/>
+              </a:xfrm>
+              <a:prstGeom prst="rect">
+                <a:avLst/>
+              </a:prstGeom>
+            </p:spPr>
+            <p:txBody>
+              <a:bodyPr wrap="none">
+                <a:spAutoFit/>
+              </a:bodyPr>
+              <a:lstStyle/>
+              <a:p>
+                <a14:m>
+                  <m:oMath xmlns:m="http://schemas.openxmlformats.org/officeDocument/2006/math">
+                    <m:r>
+                      <a:rPr lang="de-DE" b="0" i="1" dirty="0" smtClean="0">
+                        <a:latin typeface="Cambria Math" panose="02040503050406030204" pitchFamily="18" charset="0"/>
+                      </a:rPr>
+                      <m:t>𝑔</m:t>
+                    </m:r>
+                    <m:r>
+                      <a:rPr lang="de-DE" i="1" dirty="0" smtClean="0">
+                        <a:latin typeface="Cambria Math" panose="02040503050406030204" pitchFamily="18" charset="0"/>
+                      </a:rPr>
+                      <m:t>(</m:t>
+                    </m:r>
+                    <m:sSub>
+                      <m:sSubPr>
+                        <m:ctrlPr>
+                          <a:rPr lang="de-DE" b="0" i="1" dirty="0" smtClean="0">
+                            <a:latin typeface="Cambria Math" panose="02040503050406030204" pitchFamily="18" charset="0"/>
+                          </a:rPr>
+                        </m:ctrlPr>
+                      </m:sSubPr>
+                      <m:e>
+                        <m:r>
+                          <a:rPr lang="de-DE" i="1" dirty="0" smtClean="0">
+                            <a:latin typeface="Cambria Math" panose="02040503050406030204" pitchFamily="18" charset="0"/>
+                          </a:rPr>
+                          <m:t>𝑆</m:t>
+                        </m:r>
+                      </m:e>
+                      <m:sub>
+                        <m:r>
+                          <a:rPr lang="de-DE" b="0" i="1" dirty="0" smtClean="0">
+                            <a:latin typeface="Cambria Math" panose="02040503050406030204" pitchFamily="18" charset="0"/>
+                          </a:rPr>
+                          <m:t>2</m:t>
+                        </m:r>
+                      </m:sub>
+                    </m:sSub>
+                    <m:r>
+                      <a:rPr lang="de-DE" i="1" dirty="0" err="1">
+                        <a:latin typeface="Cambria Math" panose="02040503050406030204" pitchFamily="18" charset="0"/>
+                      </a:rPr>
+                      <m:t>,</m:t>
+                    </m:r>
+                    <m:r>
+                      <a:rPr lang="de-DE" i="1" dirty="0" err="1">
+                        <a:latin typeface="Cambria Math" panose="02040503050406030204" pitchFamily="18" charset="0"/>
+                      </a:rPr>
+                      <m:t>𝑄𝑜</m:t>
+                    </m:r>
+                    <m:sSub>
+                      <m:sSubPr>
+                        <m:ctrlPr>
+                          <a:rPr lang="de-DE" b="0" i="1" dirty="0" smtClean="0">
+                            <a:latin typeface="Cambria Math" panose="02040503050406030204" pitchFamily="18" charset="0"/>
+                          </a:rPr>
+                        </m:ctrlPr>
+                      </m:sSubPr>
+                      <m:e>
+                        <m:r>
+                          <a:rPr lang="de-DE" b="0" i="1" dirty="0" smtClean="0">
+                            <a:latin typeface="Cambria Math" panose="02040503050406030204" pitchFamily="18" charset="0"/>
+                          </a:rPr>
+                          <m:t>𝑆</m:t>
+                        </m:r>
+                      </m:e>
+                      <m:sub>
+                        <m:r>
+                          <a:rPr lang="de-DE" b="0" i="1" dirty="0" smtClean="0">
+                            <a:latin typeface="Cambria Math" panose="02040503050406030204" pitchFamily="18" charset="0"/>
+                          </a:rPr>
+                          <m:t>𝑁𝑒𝑡</m:t>
+                        </m:r>
+                      </m:sub>
+                    </m:sSub>
+                    <m:r>
+                      <a:rPr lang="de-DE" i="1" dirty="0">
+                        <a:latin typeface="Cambria Math" panose="02040503050406030204" pitchFamily="18" charset="0"/>
+                      </a:rPr>
+                      <m:t>)</m:t>
+                    </m:r>
+                  </m:oMath>
+                </a14:m>
+                <a:r>
+                  <a:rPr lang="de-DE" dirty="0"/>
+                  <a:t> </a:t>
+                </a:r>
+                <a:endParaRPr lang="en-US" dirty="0"/>
+              </a:p>
+            </p:txBody>
+          </p:sp>
+        </mc:Choice>
+        <mc:Fallback>
+          <p:sp>
+            <p:nvSpPr>
+              <p:cNvPr id="26" name="Rechteck 25"/>
+              <p:cNvSpPr>
+                <a:spLocks noRot="1" noChangeAspect="1" noMove="1" noResize="1" noEditPoints="1" noAdjustHandles="1" noChangeArrowheads="1" noChangeShapeType="1" noTextEdit="1"/>
+              </p:cNvSpPr>
+              <p:nvPr/>
+            </p:nvSpPr>
+            <p:spPr>
+              <a:xfrm>
+                <a:off x="2003021" y="2806728"/>
+                <a:ext cx="1582036" cy="369332"/>
+              </a:xfrm>
+              <a:prstGeom prst="rect">
+                <a:avLst/>
+              </a:prstGeom>
+              <a:blipFill rotWithShape="0">
+                <a:blip r:embed="rId11"/>
+                <a:stretch>
+                  <a:fillRect b="-13115"/>
+                </a:stretch>
+              </a:blipFill>
+            </p:spPr>
+            <p:txBody>
+              <a:bodyPr/>
+              <a:lstStyle/>
+              <a:p>
+                <a:r>
+                  <a:rPr lang="en-US">
+                    <a:noFill/>
+                  </a:rPr>
+                  <a:t> </a:t>
+                </a:r>
+              </a:p>
+            </p:txBody>
+          </p:sp>
+        </mc:Fallback>
+      </mc:AlternateContent>
+    </p:spTree>
+    <p:extLst>
+      <p:ext uri="{BB962C8B-B14F-4D97-AF65-F5344CB8AC3E}">
+        <p14:creationId xmlns:p14="http://schemas.microsoft.com/office/powerpoint/2010/main" val="757105230"/>
+      </p:ext>
+    </p:extLst>
+  </p:cSld>
+  <p:clrMapOvr>
+    <a:masterClrMapping/>
+  </p:clrMapOvr>
 </p:sld>
 </file>
 

</xml_diff>